<commit_message>
simple model for diabetes datasets
</commit_message>
<xml_diff>
--- a/Control & Machine Learning/CML_Manikanta_Rajoli.pptx
+++ b/Control & Machine Learning/CML_Manikanta_Rajoli.pptx
@@ -20475,7 +20475,11 @@
               <a:buNone/>
             </a:pPr>
             <a:r>
-              <a:rPr lang="en-GB" sz="1200" dirty="0"/>
+              <a:rPr lang="en-GB" sz="1200" dirty="0">
+                <a:latin typeface="Open Sans" panose="020B0606030504020204" pitchFamily="34" charset="0"/>
+                <a:ea typeface="Open Sans" panose="020B0606030504020204" pitchFamily="34" charset="0"/>
+                <a:cs typeface="Open Sans" panose="020B0606030504020204" pitchFamily="34" charset="0"/>
+              </a:rPr>
               <a:t>Need for Complex Activation Function</a:t>
             </a:r>
           </a:p>

</xml_diff>